<commit_message>
Move DevOps to separate file
</commit_message>
<xml_diff>
--- a/fig/AWS_Simple_Icons_PPT_v16.2.22.pptx
+++ b/fig/AWS_Simple_Icons_PPT_v16.2.22.pptx
@@ -268,7 +268,7 @@
       </p14:sectionLst>
     </p:ext>
     <p:ext uri="{EFAFB233-063F-42B5-8137-9DF3F51BA10A}">
-      <p15:sldGuideLst xmlns:p15="http://schemas.microsoft.com/office/powerpoint/2012/main" xmlns="">
+      <p15:sldGuideLst xmlns="" xmlns:p15="http://schemas.microsoft.com/office/powerpoint/2012/main">
         <p15:guide id="1" orient="horz" pos="644">
           <p15:clr>
             <a:srgbClr val="A4A3A4"/>
@@ -504,7 +504,7 @@
             <a:fld id="{0B25AC41-3BEC-9247-8322-91B80C013F2D}" type="datetimeFigureOut">
               <a:rPr lang="en-US" smtClean="0"/>
               <a:pPr/>
-              <a:t>6/22/16</a:t>
+              <a:t>7/3/16</a:t>
             </a:fld>
             <a:endParaRPr lang="en-US" dirty="0"/>
           </a:p>
@@ -29280,8 +29280,27 @@
                 <a:ea typeface="Verdana" pitchFamily="34" charset="0"/>
                 <a:cs typeface="Open Sans Light"/>
               </a:rPr>
-              <a:t>Availability Zone</a:t>
-            </a:r>
+              <a:t>Availability </a:t>
+            </a:r>
+            <a:r>
+              <a:rPr lang="en-US" sz="1200" dirty="0" smtClean="0">
+                <a:solidFill>
+                  <a:srgbClr val="F7981F"/>
+                </a:solidFill>
+                <a:latin typeface="Open Sans Light"/>
+                <a:ea typeface="Verdana" pitchFamily="34" charset="0"/>
+                <a:cs typeface="Open Sans Light"/>
+              </a:rPr>
+              <a:t>Zone a</a:t>
+            </a:r>
+            <a:endParaRPr lang="en-US" sz="1200" dirty="0">
+              <a:solidFill>
+                <a:srgbClr val="F7981F"/>
+              </a:solidFill>
+              <a:latin typeface="Open Sans Light"/>
+              <a:ea typeface="Verdana" pitchFamily="34" charset="0"/>
+              <a:cs typeface="Open Sans Light"/>
+            </a:endParaRPr>
           </a:p>
         </p:txBody>
       </p:sp>
@@ -29324,7 +29343,7 @@
                 <a:ea typeface="Verdana" pitchFamily="34" charset="0"/>
                 <a:cs typeface="Open Sans Light"/>
               </a:rPr>
-              <a:t>region</a:t>
+              <a:t>region us-west-2</a:t>
             </a:r>
             <a:endParaRPr lang="en-US" sz="1200" dirty="0">
               <a:solidFill>
@@ -29433,7 +29452,7 @@
                 <a:ea typeface="Verdana" pitchFamily="34" charset="0"/>
                 <a:cs typeface="Open Sans Light"/>
               </a:rPr>
-              <a:t>subnet</a:t>
+              <a:t>subnet A</a:t>
             </a:r>
             <a:endParaRPr lang="en-US" sz="1200" dirty="0">
               <a:latin typeface="Open Sans Light"/>
@@ -36106,7 +36125,7 @@
   <a:extraClrSchemeLst/>
   <a:extLst>
     <a:ext uri="{05A4C25C-085E-4340-85A3-A5531E510DB2}">
-      <thm15:themeFamily xmlns:thm15="http://schemas.microsoft.com/office/thememl/2012/main" xmlns="" name="AWS PPT template" id="{82A343B7-D19D-4E6E-9E5D-C6238F1C4303}" vid="{1B8EB16C-F7CF-4AA2-8EB3-83C0A947C657}"/>
+      <thm15:themeFamily xmlns="" xmlns:thm15="http://schemas.microsoft.com/office/thememl/2012/main" name="AWS PPT template" id="{82A343B7-D19D-4E6E-9E5D-C6238F1C4303}" vid="{1B8EB16C-F7CF-4AA2-8EB3-83C0A947C657}"/>
     </a:ext>
   </a:extLst>
 </a:theme>

</xml_diff>